<commit_message>
New slides for static list implementation
</commit_message>
<xml_diff>
--- a/Linear Data Structures.pptx
+++ b/Linear Data Structures.pptx
@@ -10,6 +10,9 @@
     <p:sldId id="257" r:id="rId4"/>
     <p:sldId id="258" r:id="rId5"/>
     <p:sldId id="260" r:id="rId6"/>
+    <p:sldId id="261" r:id="rId7"/>
+    <p:sldId id="262" r:id="rId8"/>
+    <p:sldId id="263" r:id="rId9"/>
   </p:sldIdLst>
   <p:sldSz cx="12192000" cy="6858000"/>
   <p:notesSz cx="6858000" cy="9144000"/>
@@ -329,7 +332,7 @@
           <a:p>
             <a:fld id="{5CFB35DB-DAC8-46D3-A03B-66B5F82307B5}" type="datetimeFigureOut">
               <a:rPr lang="bg-BG" smtClean="0"/>
-              <a:t>29.9.2023 г.</a:t>
+              <a:t>1.10.2023 г.</a:t>
             </a:fld>
             <a:endParaRPr lang="bg-BG"/>
           </a:p>
@@ -620,7 +623,7 @@
           <a:p>
             <a:fld id="{5CFB35DB-DAC8-46D3-A03B-66B5F82307B5}" type="datetimeFigureOut">
               <a:rPr lang="bg-BG" smtClean="0"/>
-              <a:t>29.9.2023 г.</a:t>
+              <a:t>1.10.2023 г.</a:t>
             </a:fld>
             <a:endParaRPr lang="bg-BG"/>
           </a:p>
@@ -879,7 +882,7 @@
           <a:p>
             <a:fld id="{5CFB35DB-DAC8-46D3-A03B-66B5F82307B5}" type="datetimeFigureOut">
               <a:rPr lang="bg-BG" smtClean="0"/>
-              <a:t>29.9.2023 г.</a:t>
+              <a:t>1.10.2023 г.</a:t>
             </a:fld>
             <a:endParaRPr lang="bg-BG"/>
           </a:p>
@@ -1348,7 +1351,7 @@
           <a:p>
             <a:fld id="{5CFB35DB-DAC8-46D3-A03B-66B5F82307B5}" type="datetimeFigureOut">
               <a:rPr lang="bg-BG" smtClean="0"/>
-              <a:t>29.9.2023 г.</a:t>
+              <a:t>1.10.2023 г.</a:t>
             </a:fld>
             <a:endParaRPr lang="bg-BG"/>
           </a:p>
@@ -1528,7 +1531,7 @@
           <a:p>
             <a:fld id="{5CFB35DB-DAC8-46D3-A03B-66B5F82307B5}" type="datetimeFigureOut">
               <a:rPr lang="bg-BG" smtClean="0"/>
-              <a:t>29.9.2023 г.</a:t>
+              <a:t>1.10.2023 г.</a:t>
             </a:fld>
             <a:endParaRPr lang="bg-BG"/>
           </a:p>
@@ -2104,7 +2107,7 @@
           <a:p>
             <a:fld id="{5CFB35DB-DAC8-46D3-A03B-66B5F82307B5}" type="datetimeFigureOut">
               <a:rPr lang="bg-BG" smtClean="0"/>
-              <a:t>29.9.2023 г.</a:t>
+              <a:t>1.10.2023 г.</a:t>
             </a:fld>
             <a:endParaRPr lang="bg-BG"/>
           </a:p>
@@ -2436,7 +2439,7 @@
           <a:p>
             <a:fld id="{5CFB35DB-DAC8-46D3-A03B-66B5F82307B5}" type="datetimeFigureOut">
               <a:rPr lang="bg-BG" smtClean="0"/>
-              <a:t>29.9.2023 г.</a:t>
+              <a:t>1.10.2023 г.</a:t>
             </a:fld>
             <a:endParaRPr lang="bg-BG"/>
           </a:p>
@@ -2611,7 +2614,7 @@
           <a:p>
             <a:fld id="{5CFB35DB-DAC8-46D3-A03B-66B5F82307B5}" type="datetimeFigureOut">
               <a:rPr lang="bg-BG" smtClean="0"/>
-              <a:t>29.9.2023 г.</a:t>
+              <a:t>1.10.2023 г.</a:t>
             </a:fld>
             <a:endParaRPr lang="bg-BG"/>
           </a:p>
@@ -2791,7 +2794,7 @@
           <a:p>
             <a:fld id="{5CFB35DB-DAC8-46D3-A03B-66B5F82307B5}" type="datetimeFigureOut">
               <a:rPr lang="bg-BG" smtClean="0"/>
-              <a:t>29.9.2023 г.</a:t>
+              <a:t>1.10.2023 г.</a:t>
             </a:fld>
             <a:endParaRPr lang="bg-BG"/>
           </a:p>
@@ -2961,7 +2964,7 @@
           <a:p>
             <a:fld id="{5CFB35DB-DAC8-46D3-A03B-66B5F82307B5}" type="datetimeFigureOut">
               <a:rPr lang="bg-BG" smtClean="0"/>
-              <a:t>29.9.2023 г.</a:t>
+              <a:t>1.10.2023 г.</a:t>
             </a:fld>
             <a:endParaRPr lang="bg-BG"/>
           </a:p>
@@ -3218,7 +3221,7 @@
           <a:p>
             <a:fld id="{5CFB35DB-DAC8-46D3-A03B-66B5F82307B5}" type="datetimeFigureOut">
               <a:rPr lang="bg-BG" smtClean="0"/>
-              <a:t>29.9.2023 г.</a:t>
+              <a:t>1.10.2023 г.</a:t>
             </a:fld>
             <a:endParaRPr lang="bg-BG"/>
           </a:p>
@@ -3510,7 +3513,7 @@
           <a:p>
             <a:fld id="{5CFB35DB-DAC8-46D3-A03B-66B5F82307B5}" type="datetimeFigureOut">
               <a:rPr lang="bg-BG" smtClean="0"/>
-              <a:t>29.9.2023 г.</a:t>
+              <a:t>1.10.2023 г.</a:t>
             </a:fld>
             <a:endParaRPr lang="bg-BG"/>
           </a:p>
@@ -3940,7 +3943,7 @@
           <a:p>
             <a:fld id="{5CFB35DB-DAC8-46D3-A03B-66B5F82307B5}" type="datetimeFigureOut">
               <a:rPr lang="bg-BG" smtClean="0"/>
-              <a:t>29.9.2023 г.</a:t>
+              <a:t>1.10.2023 г.</a:t>
             </a:fld>
             <a:endParaRPr lang="bg-BG"/>
           </a:p>
@@ -4058,7 +4061,7 @@
           <a:p>
             <a:fld id="{5CFB35DB-DAC8-46D3-A03B-66B5F82307B5}" type="datetimeFigureOut">
               <a:rPr lang="bg-BG" smtClean="0"/>
-              <a:t>29.9.2023 г.</a:t>
+              <a:t>1.10.2023 г.</a:t>
             </a:fld>
             <a:endParaRPr lang="bg-BG"/>
           </a:p>
@@ -4153,7 +4156,7 @@
           <a:p>
             <a:fld id="{5CFB35DB-DAC8-46D3-A03B-66B5F82307B5}" type="datetimeFigureOut">
               <a:rPr lang="bg-BG" smtClean="0"/>
-              <a:t>29.9.2023 г.</a:t>
+              <a:t>1.10.2023 г.</a:t>
             </a:fld>
             <a:endParaRPr lang="bg-BG"/>
           </a:p>
@@ -4436,7 +4439,7 @@
           <a:p>
             <a:fld id="{5CFB35DB-DAC8-46D3-A03B-66B5F82307B5}" type="datetimeFigureOut">
               <a:rPr lang="bg-BG" smtClean="0"/>
-              <a:t>29.9.2023 г.</a:t>
+              <a:t>1.10.2023 г.</a:t>
             </a:fld>
             <a:endParaRPr lang="bg-BG"/>
           </a:p>
@@ -4727,7 +4730,7 @@
           <a:p>
             <a:fld id="{5CFB35DB-DAC8-46D3-A03B-66B5F82307B5}" type="datetimeFigureOut">
               <a:rPr lang="bg-BG" smtClean="0"/>
-              <a:t>29.9.2023 г.</a:t>
+              <a:t>1.10.2023 г.</a:t>
             </a:fld>
             <a:endParaRPr lang="bg-BG"/>
           </a:p>
@@ -4958,7 +4961,7 @@
           <a:p>
             <a:fld id="{5CFB35DB-DAC8-46D3-A03B-66B5F82307B5}" type="datetimeFigureOut">
               <a:rPr lang="bg-BG" smtClean="0"/>
-              <a:t>29.9.2023 г.</a:t>
+              <a:t>1.10.2023 г.</a:t>
             </a:fld>
             <a:endParaRPr lang="bg-BG"/>
           </a:p>
@@ -6511,8 +6514,8 @@
         </p:nvSpPr>
         <p:spPr>
           <a:xfrm>
-            <a:off x="643192" y="609600"/>
-            <a:ext cx="3643674" cy="1905000"/>
+            <a:off x="643192" y="708454"/>
+            <a:ext cx="3643674" cy="972065"/>
           </a:xfrm>
         </p:spPr>
         <p:txBody>
@@ -6524,7 +6527,7 @@
             <a:pPr algn="ctr"/>
             <a:r>
               <a:rPr lang="en-US" sz="2800" dirty="0"/>
-              <a:t>List ADT</a:t>
+              <a:t>List</a:t>
             </a:r>
             <a:endParaRPr lang="bg-BG" sz="2800" dirty="0"/>
           </a:p>
@@ -6548,8 +6551,8 @@
         </p:nvSpPr>
         <p:spPr>
           <a:xfrm>
-            <a:off x="643192" y="2075935"/>
-            <a:ext cx="3643674" cy="3807340"/>
+            <a:off x="643192" y="1548714"/>
+            <a:ext cx="3643674" cy="4334561"/>
           </a:xfrm>
         </p:spPr>
         <p:txBody>
@@ -6558,6 +6561,18 @@
           </a:bodyPr>
           <a:lstStyle/>
           <a:p>
+            <a:pPr marL="0" indent="0">
+              <a:buNone/>
+            </a:pPr>
+            <a:endParaRPr lang="bg-BG" sz="1800" dirty="0">
+              <a:solidFill>
+                <a:srgbClr val="92D050"/>
+              </a:solidFill>
+              <a:latin typeface="Arial" panose="020B0604020202020204" pitchFamily="34" charset="0"/>
+              <a:cs typeface="Arial" panose="020B0604020202020204" pitchFamily="34" charset="0"/>
+            </a:endParaRPr>
+          </a:p>
+          <a:p>
             <a:r>
               <a:rPr lang="en-US" sz="1800" dirty="0">
                 <a:solidFill>
@@ -6566,6 +6581,42 @@
                 <a:latin typeface="Arial" panose="020B0604020202020204" pitchFamily="34" charset="0"/>
                 <a:cs typeface="Arial" panose="020B0604020202020204" pitchFamily="34" charset="0"/>
               </a:rPr>
+              <a:t>List</a:t>
+            </a:r>
+            <a:r>
+              <a:rPr lang="bg-BG" sz="1800" dirty="0">
+                <a:solidFill>
+                  <a:srgbClr val="92D050"/>
+                </a:solidFill>
+                <a:latin typeface="Arial" panose="020B0604020202020204" pitchFamily="34" charset="0"/>
+                <a:cs typeface="Arial" panose="020B0604020202020204" pitchFamily="34" charset="0"/>
+              </a:rPr>
+              <a:t> </a:t>
+            </a:r>
+            <a:r>
+              <a:rPr lang="bg-BG" sz="1800" dirty="0">
+                <a:latin typeface="Arial" panose="020B0604020202020204" pitchFamily="34" charset="0"/>
+                <a:cs typeface="Arial" panose="020B0604020202020204" pitchFamily="34" charset="0"/>
+              </a:rPr>
+              <a:t>е колекция от елементи от един и същи тип.</a:t>
+            </a:r>
+            <a:endParaRPr lang="en-US" sz="1800" dirty="0">
+              <a:solidFill>
+                <a:srgbClr val="92D050"/>
+              </a:solidFill>
+              <a:latin typeface="Arial" panose="020B0604020202020204" pitchFamily="34" charset="0"/>
+              <a:cs typeface="Arial" panose="020B0604020202020204" pitchFamily="34" charset="0"/>
+            </a:endParaRPr>
+          </a:p>
+          <a:p>
+            <a:r>
+              <a:rPr lang="en-US" sz="1800" dirty="0">
+                <a:solidFill>
+                  <a:srgbClr val="92D050"/>
+                </a:solidFill>
+                <a:latin typeface="Arial" panose="020B0604020202020204" pitchFamily="34" charset="0"/>
+                <a:cs typeface="Arial" panose="020B0604020202020204" pitchFamily="34" charset="0"/>
+              </a:rPr>
               <a:t>List </a:t>
             </a:r>
             <a:r>
@@ -6583,7 +6634,17 @@
                 <a:latin typeface="Arial" panose="020B0604020202020204" pitchFamily="34" charset="0"/>
                 <a:cs typeface="Arial" panose="020B0604020202020204" pitchFamily="34" charset="0"/>
               </a:rPr>
-              <a:t> ADT </a:t>
+              <a:t> ADT</a:t>
+            </a:r>
+            <a:r>
+              <a:rPr lang="bg-BG" sz="1800" dirty="0">
+                <a:solidFill>
+                  <a:srgbClr val="92D050"/>
+                </a:solidFill>
+                <a:latin typeface="Arial" panose="020B0604020202020204" pitchFamily="34" charset="0"/>
+                <a:cs typeface="Arial" panose="020B0604020202020204" pitchFamily="34" charset="0"/>
+              </a:rPr>
+              <a:t> </a:t>
             </a:r>
             <a:r>
               <a:rPr lang="bg-BG" sz="1800" dirty="0">
@@ -6724,6 +6785,804 @@
     <p:extLst>
       <p:ext uri="{BB962C8B-B14F-4D97-AF65-F5344CB8AC3E}">
         <p14:creationId xmlns:p14="http://schemas.microsoft.com/office/powerpoint/2010/main" val="4207801469"/>
+      </p:ext>
+    </p:extLst>
+  </p:cSld>
+  <p:clrMapOvr>
+    <a:masterClrMapping/>
+  </p:clrMapOvr>
+</p:sld>
+</file>
+
+<file path=ppt/slides/slide6.xml><?xml version="1.0" encoding="utf-8"?>
+<p:sld xmlns:a="http://schemas.openxmlformats.org/drawingml/2006/main" xmlns:r="http://schemas.openxmlformats.org/officeDocument/2006/relationships" xmlns:p="http://schemas.openxmlformats.org/presentationml/2006/main">
+  <p:cSld>
+    <p:spTree>
+      <p:nvGrpSpPr>
+        <p:cNvPr id="1" name=""/>
+        <p:cNvGrpSpPr/>
+        <p:nvPr/>
+      </p:nvGrpSpPr>
+      <p:grpSpPr>
+        <a:xfrm>
+          <a:off x="0" y="0"/>
+          <a:ext cx="0" cy="0"/>
+          <a:chOff x="0" y="0"/>
+          <a:chExt cx="0" cy="0"/>
+        </a:xfrm>
+      </p:grpSpPr>
+      <p:sp>
+        <p:nvSpPr>
+          <p:cNvPr id="2" name="Title 1">
+            <a:extLst>
+              <a:ext uri="{FF2B5EF4-FFF2-40B4-BE49-F238E27FC236}">
+                <a16:creationId xmlns:a16="http://schemas.microsoft.com/office/drawing/2014/main" id="{43D04E42-E70C-1364-BCF7-9C0DFBEE72DA}"/>
+              </a:ext>
+            </a:extLst>
+          </p:cNvPr>
+          <p:cNvSpPr>
+            <a:spLocks noGrp="1"/>
+          </p:cNvSpPr>
+          <p:nvPr>
+            <p:ph type="title"/>
+          </p:nvPr>
+        </p:nvSpPr>
+        <p:spPr/>
+        <p:txBody>
+          <a:bodyPr/>
+          <a:lstStyle/>
+          <a:p>
+            <a:pPr algn="ctr"/>
+            <a:r>
+              <a:rPr lang="en-US" dirty="0">
+                <a:solidFill>
+                  <a:srgbClr val="92D050"/>
+                </a:solidFill>
+                <a:latin typeface="Arial" panose="020B0604020202020204" pitchFamily="34" charset="0"/>
+                <a:cs typeface="Arial" panose="020B0604020202020204" pitchFamily="34" charset="0"/>
+              </a:rPr>
+              <a:t>List</a:t>
+            </a:r>
+            <a:r>
+              <a:rPr lang="bg-BG" dirty="0">
+                <a:latin typeface="Arial" panose="020B0604020202020204" pitchFamily="34" charset="0"/>
+                <a:cs typeface="Arial" panose="020B0604020202020204" pitchFamily="34" charset="0"/>
+              </a:rPr>
+              <a:t> </a:t>
+            </a:r>
+            <a:r>
+              <a:rPr lang="en-US" dirty="0">
+                <a:latin typeface="Arial" panose="020B0604020202020204" pitchFamily="34" charset="0"/>
+                <a:cs typeface="Arial" panose="020B0604020202020204" pitchFamily="34" charset="0"/>
+              </a:rPr>
+              <a:t>ADT</a:t>
+            </a:r>
+            <a:r>
+              <a:rPr lang="bg-BG" dirty="0">
+                <a:latin typeface="Arial" panose="020B0604020202020204" pitchFamily="34" charset="0"/>
+                <a:cs typeface="Arial" panose="020B0604020202020204" pitchFamily="34" charset="0"/>
+              </a:rPr>
+              <a:t> (</a:t>
+            </a:r>
+            <a:r>
+              <a:rPr lang="en-US" dirty="0">
+                <a:latin typeface="Arial" panose="020B0604020202020204" pitchFamily="34" charset="0"/>
+                <a:cs typeface="Arial" panose="020B0604020202020204" pitchFamily="34" charset="0"/>
+              </a:rPr>
+              <a:t>static</a:t>
+            </a:r>
+            <a:r>
+              <a:rPr lang="bg-BG" dirty="0">
+                <a:latin typeface="Arial" panose="020B0604020202020204" pitchFamily="34" charset="0"/>
+                <a:cs typeface="Arial" panose="020B0604020202020204" pitchFamily="34" charset="0"/>
+              </a:rPr>
+              <a:t>)</a:t>
+            </a:r>
+            <a:r>
+              <a:rPr lang="en-US" dirty="0">
+                <a:latin typeface="Arial" panose="020B0604020202020204" pitchFamily="34" charset="0"/>
+                <a:cs typeface="Arial" panose="020B0604020202020204" pitchFamily="34" charset="0"/>
+              </a:rPr>
+              <a:t> KATO </a:t>
+            </a:r>
+            <a:r>
+              <a:rPr lang="bg-BG" dirty="0">
+                <a:solidFill>
+                  <a:srgbClr val="92D050"/>
+                </a:solidFill>
+                <a:latin typeface="Arial" panose="020B0604020202020204" pitchFamily="34" charset="0"/>
+                <a:cs typeface="Arial" panose="020B0604020202020204" pitchFamily="34" charset="0"/>
+              </a:rPr>
+              <a:t>СТАТИЧЕН МАСИВ </a:t>
+            </a:r>
+          </a:p>
+        </p:txBody>
+      </p:sp>
+      <p:sp>
+        <p:nvSpPr>
+          <p:cNvPr id="3" name="Content Placeholder 2">
+            <a:extLst>
+              <a:ext uri="{FF2B5EF4-FFF2-40B4-BE49-F238E27FC236}">
+                <a16:creationId xmlns:a16="http://schemas.microsoft.com/office/drawing/2014/main" id="{73D8E59B-B26E-3B7F-CA1B-C9F4D3173088}"/>
+              </a:ext>
+            </a:extLst>
+          </p:cNvPr>
+          <p:cNvSpPr>
+            <a:spLocks noGrp="1"/>
+          </p:cNvSpPr>
+          <p:nvPr>
+            <p:ph idx="1"/>
+          </p:nvPr>
+        </p:nvSpPr>
+        <p:spPr>
+          <a:xfrm>
+            <a:off x="1059035" y="2238633"/>
+            <a:ext cx="9905998" cy="1361304"/>
+          </a:xfrm>
+        </p:spPr>
+        <p:txBody>
+          <a:bodyPr/>
+          <a:lstStyle/>
+          <a:p>
+            <a:r>
+              <a:rPr lang="bg-BG" dirty="0">
+                <a:solidFill>
+                  <a:srgbClr val="92D050"/>
+                </a:solidFill>
+                <a:latin typeface="Arial" panose="020B0604020202020204" pitchFamily="34" charset="0"/>
+                <a:cs typeface="Arial" panose="020B0604020202020204" pitchFamily="34" charset="0"/>
+              </a:rPr>
+              <a:t>Статичният</a:t>
+            </a:r>
+            <a:r>
+              <a:rPr lang="bg-BG" dirty="0">
+                <a:latin typeface="Arial" panose="020B0604020202020204" pitchFamily="34" charset="0"/>
+                <a:cs typeface="Arial" panose="020B0604020202020204" pitchFamily="34" charset="0"/>
+              </a:rPr>
+              <a:t> </a:t>
+            </a:r>
+            <a:r>
+              <a:rPr lang="en-US" dirty="0">
+                <a:solidFill>
+                  <a:srgbClr val="FFFF00"/>
+                </a:solidFill>
+                <a:latin typeface="Arial" panose="020B0604020202020204" pitchFamily="34" charset="0"/>
+                <a:cs typeface="Arial" panose="020B0604020202020204" pitchFamily="34" charset="0"/>
+              </a:rPr>
+              <a:t>List</a:t>
+            </a:r>
+            <a:r>
+              <a:rPr lang="en-US" dirty="0">
+                <a:latin typeface="Arial" panose="020B0604020202020204" pitchFamily="34" charset="0"/>
+                <a:cs typeface="Arial" panose="020B0604020202020204" pitchFamily="34" charset="0"/>
+              </a:rPr>
+              <a:t> </a:t>
+            </a:r>
+            <a:r>
+              <a:rPr lang="bg-BG" dirty="0">
+                <a:latin typeface="Arial" panose="020B0604020202020204" pitchFamily="34" charset="0"/>
+                <a:cs typeface="Arial" panose="020B0604020202020204" pitchFamily="34" charset="0"/>
+              </a:rPr>
+              <a:t>е имплементиран чрез </a:t>
+            </a:r>
+            <a:r>
+              <a:rPr lang="bg-BG" dirty="0">
+                <a:solidFill>
+                  <a:srgbClr val="92D050"/>
+                </a:solidFill>
+                <a:latin typeface="Arial" panose="020B0604020202020204" pitchFamily="34" charset="0"/>
+                <a:cs typeface="Arial" panose="020B0604020202020204" pitchFamily="34" charset="0"/>
+              </a:rPr>
+              <a:t>статичен</a:t>
+            </a:r>
+            <a:r>
+              <a:rPr lang="bg-BG" dirty="0">
+                <a:latin typeface="Arial" panose="020B0604020202020204" pitchFamily="34" charset="0"/>
+                <a:cs typeface="Arial" panose="020B0604020202020204" pitchFamily="34" charset="0"/>
+              </a:rPr>
+              <a:t> </a:t>
+            </a:r>
+            <a:r>
+              <a:rPr lang="bg-BG" dirty="0">
+                <a:solidFill>
+                  <a:srgbClr val="92D050"/>
+                </a:solidFill>
+                <a:latin typeface="Arial" panose="020B0604020202020204" pitchFamily="34" charset="0"/>
+                <a:cs typeface="Arial" panose="020B0604020202020204" pitchFamily="34" charset="0"/>
+              </a:rPr>
+              <a:t>масив</a:t>
+            </a:r>
+            <a:r>
+              <a:rPr lang="bg-BG" dirty="0">
+                <a:latin typeface="Arial" panose="020B0604020202020204" pitchFamily="34" charset="0"/>
+                <a:cs typeface="Arial" panose="020B0604020202020204" pitchFamily="34" charset="0"/>
+              </a:rPr>
+              <a:t>, т.е. масив, който има </a:t>
+            </a:r>
+            <a:r>
+              <a:rPr lang="bg-BG" dirty="0">
+                <a:solidFill>
+                  <a:srgbClr val="92D050"/>
+                </a:solidFill>
+                <a:latin typeface="Arial" panose="020B0604020202020204" pitchFamily="34" charset="0"/>
+                <a:cs typeface="Arial" panose="020B0604020202020204" pitchFamily="34" charset="0"/>
+              </a:rPr>
+              <a:t>фиксиран</a:t>
+            </a:r>
+            <a:r>
+              <a:rPr lang="bg-BG" dirty="0">
+                <a:latin typeface="Arial" panose="020B0604020202020204" pitchFamily="34" charset="0"/>
+                <a:cs typeface="Arial" panose="020B0604020202020204" pitchFamily="34" charset="0"/>
+              </a:rPr>
+              <a:t> размер, зададен в момента на инициализирането му</a:t>
+            </a:r>
+            <a:r>
+              <a:rPr lang="en-US" dirty="0">
+                <a:latin typeface="Arial" panose="020B0604020202020204" pitchFamily="34" charset="0"/>
+                <a:cs typeface="Arial" panose="020B0604020202020204" pitchFamily="34" charset="0"/>
+              </a:rPr>
+              <a:t>. </a:t>
+            </a:r>
+            <a:r>
+              <a:rPr lang="bg-BG" dirty="0">
+                <a:latin typeface="Arial" panose="020B0604020202020204" pitchFamily="34" charset="0"/>
+                <a:cs typeface="Arial" panose="020B0604020202020204" pitchFamily="34" charset="0"/>
+              </a:rPr>
+              <a:t>Елементите на масива са разположени на </a:t>
+            </a:r>
+            <a:r>
+              <a:rPr lang="bg-BG" dirty="0">
+                <a:solidFill>
+                  <a:srgbClr val="92D050"/>
+                </a:solidFill>
+                <a:latin typeface="Arial" panose="020B0604020202020204" pitchFamily="34" charset="0"/>
+                <a:cs typeface="Arial" panose="020B0604020202020204" pitchFamily="34" charset="0"/>
+              </a:rPr>
+              <a:t>съседни</a:t>
+            </a:r>
+            <a:r>
+              <a:rPr lang="bg-BG" dirty="0">
+                <a:latin typeface="Arial" panose="020B0604020202020204" pitchFamily="34" charset="0"/>
+                <a:cs typeface="Arial" panose="020B0604020202020204" pitchFamily="34" charset="0"/>
+              </a:rPr>
+              <a:t> места в </a:t>
+            </a:r>
+            <a:r>
+              <a:rPr lang="bg-BG" dirty="0">
+                <a:solidFill>
+                  <a:srgbClr val="92D050"/>
+                </a:solidFill>
+                <a:latin typeface="Arial" panose="020B0604020202020204" pitchFamily="34" charset="0"/>
+                <a:cs typeface="Arial" panose="020B0604020202020204" pitchFamily="34" charset="0"/>
+              </a:rPr>
+              <a:t>паметта</a:t>
+            </a:r>
+            <a:r>
+              <a:rPr lang="bg-BG" dirty="0">
+                <a:latin typeface="Arial" panose="020B0604020202020204" pitchFamily="34" charset="0"/>
+                <a:cs typeface="Arial" panose="020B0604020202020204" pitchFamily="34" charset="0"/>
+              </a:rPr>
+              <a:t>.</a:t>
+            </a:r>
+          </a:p>
+        </p:txBody>
+      </p:sp>
+      <p:pic>
+        <p:nvPicPr>
+          <p:cNvPr id="5" name="Picture 4" descr="A screenshot of a cellphone&#10;&#10;Description automatically generated">
+            <a:extLst>
+              <a:ext uri="{FF2B5EF4-FFF2-40B4-BE49-F238E27FC236}">
+                <a16:creationId xmlns:a16="http://schemas.microsoft.com/office/drawing/2014/main" id="{69FF2827-B786-AD71-2DC0-8FB7B19CDF12}"/>
+              </a:ext>
+            </a:extLst>
+          </p:cNvPr>
+          <p:cNvPicPr>
+            <a:picLocks noChangeAspect="1"/>
+          </p:cNvPicPr>
+          <p:nvPr/>
+        </p:nvPicPr>
+        <p:blipFill>
+          <a:blip r:embed="rId2">
+            <a:extLst>
+              <a:ext uri="{28A0092B-C50C-407E-A947-70E740481C1C}">
+                <a14:useLocalDpi xmlns:a14="http://schemas.microsoft.com/office/drawing/2010/main" val="0"/>
+              </a:ext>
+            </a:extLst>
+          </a:blip>
+          <a:stretch>
+            <a:fillRect/>
+          </a:stretch>
+        </p:blipFill>
+        <p:spPr>
+          <a:xfrm>
+            <a:off x="2855708" y="3917349"/>
+            <a:ext cx="6312652" cy="1783235"/>
+          </a:xfrm>
+          <a:prstGeom prst="rect">
+            <a:avLst/>
+          </a:prstGeom>
+        </p:spPr>
+      </p:pic>
+    </p:spTree>
+    <p:extLst>
+      <p:ext uri="{BB962C8B-B14F-4D97-AF65-F5344CB8AC3E}">
+        <p14:creationId xmlns:p14="http://schemas.microsoft.com/office/powerpoint/2010/main" val="3542321669"/>
+      </p:ext>
+    </p:extLst>
+  </p:cSld>
+  <p:clrMapOvr>
+    <a:masterClrMapping/>
+  </p:clrMapOvr>
+</p:sld>
+</file>
+
+<file path=ppt/slides/slide7.xml><?xml version="1.0" encoding="utf-8"?>
+<p:sld xmlns:a="http://schemas.openxmlformats.org/drawingml/2006/main" xmlns:r="http://schemas.openxmlformats.org/officeDocument/2006/relationships" xmlns:p="http://schemas.openxmlformats.org/presentationml/2006/main">
+  <p:cSld>
+    <p:bg>
+      <p:bgPr>
+        <a:blipFill rotWithShape="1">
+          <a:blip r:embed="rId2">
+            <a:duotone>
+              <a:schemeClr val="bg2">
+                <a:shade val="28000"/>
+                <a:satMod val="94000"/>
+                <a:lumMod val="20000"/>
+              </a:schemeClr>
+              <a:schemeClr val="bg2">
+                <a:tint val="94000"/>
+                <a:shade val="84000"/>
+                <a:satMod val="148000"/>
+                <a:lumMod val="114000"/>
+              </a:schemeClr>
+            </a:duotone>
+          </a:blip>
+          <a:stretch/>
+        </a:blipFill>
+        <a:effectLst/>
+      </p:bgPr>
+    </p:bg>
+    <p:spTree>
+      <p:nvGrpSpPr>
+        <p:cNvPr id="1" name=""/>
+        <p:cNvGrpSpPr/>
+        <p:nvPr/>
+      </p:nvGrpSpPr>
+      <p:grpSpPr>
+        <a:xfrm>
+          <a:off x="0" y="0"/>
+          <a:ext cx="0" cy="0"/>
+          <a:chOff x="0" y="0"/>
+          <a:chExt cx="0" cy="0"/>
+        </a:xfrm>
+      </p:grpSpPr>
+      <p:sp>
+        <p:nvSpPr>
+          <p:cNvPr id="2" name="Title 1">
+            <a:extLst>
+              <a:ext uri="{FF2B5EF4-FFF2-40B4-BE49-F238E27FC236}">
+                <a16:creationId xmlns:a16="http://schemas.microsoft.com/office/drawing/2014/main" id="{50C1F10B-DC20-D69C-D27C-F1021970FA27}"/>
+              </a:ext>
+            </a:extLst>
+          </p:cNvPr>
+          <p:cNvSpPr>
+            <a:spLocks noGrp="1"/>
+          </p:cNvSpPr>
+          <p:nvPr>
+            <p:ph type="title"/>
+          </p:nvPr>
+        </p:nvSpPr>
+        <p:spPr>
+          <a:xfrm>
+            <a:off x="3040426" y="186381"/>
+            <a:ext cx="6408373" cy="1375719"/>
+          </a:xfrm>
+        </p:spPr>
+        <p:txBody>
+          <a:bodyPr vert="horz" lIns="91440" tIns="45720" rIns="91440" bIns="45720" rtlCol="0" anchor="ctr">
+            <a:normAutofit/>
+          </a:bodyPr>
+          <a:lstStyle/>
+          <a:p>
+            <a:pPr algn="ctr"/>
+            <a:r>
+              <a:rPr lang="en-US" dirty="0" err="1"/>
+              <a:t>Представяне</a:t>
+            </a:r>
+            <a:r>
+              <a:rPr lang="en-US" dirty="0"/>
+              <a:t> в </a:t>
+            </a:r>
+            <a:r>
+              <a:rPr lang="en-US" dirty="0">
+                <a:solidFill>
+                  <a:srgbClr val="92D050"/>
+                </a:solidFill>
+              </a:rPr>
+              <a:t>RAM</a:t>
+            </a:r>
+            <a:r>
+              <a:rPr lang="en-US" dirty="0"/>
+              <a:t> ПАМЕТТА</a:t>
+            </a:r>
+          </a:p>
+        </p:txBody>
+      </p:sp>
+      <p:sp>
+        <p:nvSpPr>
+          <p:cNvPr id="6" name="Content Placeholder 5">
+            <a:extLst>
+              <a:ext uri="{FF2B5EF4-FFF2-40B4-BE49-F238E27FC236}">
+                <a16:creationId xmlns:a16="http://schemas.microsoft.com/office/drawing/2014/main" id="{467F835F-CA6C-ACD9-F1E5-DCCE9D0402E7}"/>
+              </a:ext>
+            </a:extLst>
+          </p:cNvPr>
+          <p:cNvSpPr>
+            <a:spLocks noGrp="1"/>
+          </p:cNvSpPr>
+          <p:nvPr>
+            <p:ph sz="half" idx="2"/>
+          </p:nvPr>
+        </p:nvSpPr>
+        <p:spPr>
+          <a:xfrm>
+            <a:off x="6684076" y="2068799"/>
+            <a:ext cx="5122606" cy="3216276"/>
+          </a:xfrm>
+        </p:spPr>
+        <p:txBody>
+          <a:bodyPr vert="horz" lIns="91440" tIns="45720" rIns="91440" bIns="45720" rtlCol="0" anchor="t">
+            <a:normAutofit/>
+          </a:bodyPr>
+          <a:lstStyle/>
+          <a:p>
+            <a:r>
+              <a:rPr lang="bg-BG" dirty="0">
+                <a:latin typeface="Arial" panose="020B0604020202020204" pitchFamily="34" charset="0"/>
+                <a:cs typeface="Arial" panose="020B0604020202020204" pitchFamily="34" charset="0"/>
+              </a:rPr>
+              <a:t>ЕДНО ОТ КЛЮЧОВИТЕ ПРЕДИМСТВА НА МАСИВА ПРЕД НЯКОИ ДРУГИ СТРУКТУРИ ОТ ДАННИ Е </a:t>
+            </a:r>
+            <a:r>
+              <a:rPr lang="bg-BG" dirty="0">
+                <a:solidFill>
+                  <a:srgbClr val="92D050"/>
+                </a:solidFill>
+                <a:latin typeface="Arial" panose="020B0604020202020204" pitchFamily="34" charset="0"/>
+                <a:cs typeface="Arial" panose="020B0604020202020204" pitchFamily="34" charset="0"/>
+              </a:rPr>
+              <a:t>ДОСТЪПА ДО ЕЛЕМЕНТ ПО ИНДЕКС.</a:t>
+            </a:r>
+          </a:p>
+          <a:p>
+            <a:r>
+              <a:rPr lang="bg-BG" dirty="0">
+                <a:latin typeface="Arial" panose="020B0604020202020204" pitchFamily="34" charset="0"/>
+                <a:cs typeface="Arial" panose="020B0604020202020204" pitchFamily="34" charset="0"/>
+              </a:rPr>
+              <a:t>НЯМА ЗНАЧЕНИЕ ДАЛИ ДОСТЪПВАМЕ ПЪРВИЯ, СРЕДНИЯ ИЛИ ПОСЛЕДНИЯТ ЕЛЕМЕНТ В ПАМЕТТА. ДОСТЪПА Е С ТАКА НАРЕЧЕНАТА – </a:t>
+            </a:r>
+            <a:r>
+              <a:rPr lang="bg-BG" dirty="0">
+                <a:solidFill>
+                  <a:srgbClr val="92D050"/>
+                </a:solidFill>
+                <a:latin typeface="Arial" panose="020B0604020202020204" pitchFamily="34" charset="0"/>
+                <a:cs typeface="Arial" panose="020B0604020202020204" pitchFamily="34" charset="0"/>
+              </a:rPr>
+              <a:t>КОНСТАНТНА СЛОЖНОСТ</a:t>
+            </a:r>
+            <a:r>
+              <a:rPr lang="en-US" dirty="0">
+                <a:solidFill>
+                  <a:srgbClr val="92D050"/>
+                </a:solidFill>
+                <a:latin typeface="Arial" panose="020B0604020202020204" pitchFamily="34" charset="0"/>
+                <a:cs typeface="Arial" panose="020B0604020202020204" pitchFamily="34" charset="0"/>
+              </a:rPr>
+              <a:t> - </a:t>
+            </a:r>
+            <a:r>
+              <a:rPr lang="en-US" dirty="0">
+                <a:solidFill>
+                  <a:srgbClr val="FFC000"/>
+                </a:solidFill>
+                <a:latin typeface="Arial" panose="020B0604020202020204" pitchFamily="34" charset="0"/>
+                <a:cs typeface="Arial" panose="020B0604020202020204" pitchFamily="34" charset="0"/>
+              </a:rPr>
+              <a:t>O(1)</a:t>
+            </a:r>
+            <a:r>
+              <a:rPr lang="bg-BG" dirty="0">
+                <a:solidFill>
+                  <a:srgbClr val="FFC000"/>
+                </a:solidFill>
+                <a:latin typeface="Arial" panose="020B0604020202020204" pitchFamily="34" charset="0"/>
+                <a:cs typeface="Arial" panose="020B0604020202020204" pitchFamily="34" charset="0"/>
+              </a:rPr>
+              <a:t>.</a:t>
+            </a:r>
+            <a:endParaRPr lang="en-US" dirty="0">
+              <a:solidFill>
+                <a:srgbClr val="FFC000"/>
+              </a:solidFill>
+              <a:latin typeface="Arial" panose="020B0604020202020204" pitchFamily="34" charset="0"/>
+              <a:cs typeface="Arial" panose="020B0604020202020204" pitchFamily="34" charset="0"/>
+            </a:endParaRPr>
+          </a:p>
+        </p:txBody>
+      </p:sp>
+      <p:pic>
+        <p:nvPicPr>
+          <p:cNvPr id="5" name="Content Placeholder 4" descr="A screenshot of a memory game&#10;&#10;Description automatically generated">
+            <a:extLst>
+              <a:ext uri="{FF2B5EF4-FFF2-40B4-BE49-F238E27FC236}">
+                <a16:creationId xmlns:a16="http://schemas.microsoft.com/office/drawing/2014/main" id="{BB6A7702-E995-3AD4-34A1-4719F97526FB}"/>
+              </a:ext>
+            </a:extLst>
+          </p:cNvPr>
+          <p:cNvPicPr>
+            <a:picLocks noGrp="1" noChangeAspect="1"/>
+          </p:cNvPicPr>
+          <p:nvPr>
+            <p:ph sz="half" idx="1"/>
+          </p:nvPr>
+        </p:nvPicPr>
+        <p:blipFill>
+          <a:blip r:embed="rId3">
+            <a:extLst>
+              <a:ext uri="{28A0092B-C50C-407E-A947-70E740481C1C}">
+                <a14:useLocalDpi xmlns:a14="http://schemas.microsoft.com/office/drawing/2010/main" val="0"/>
+              </a:ext>
+            </a:extLst>
+          </a:blip>
+          <a:stretch>
+            <a:fillRect/>
+          </a:stretch>
+        </p:blipFill>
+        <p:spPr>
+          <a:xfrm>
+            <a:off x="1336924" y="1895303"/>
+            <a:ext cx="5022554" cy="3389771"/>
+          </a:xfrm>
+          <a:prstGeom prst="roundRect">
+            <a:avLst>
+              <a:gd name="adj" fmla="val 3517"/>
+            </a:avLst>
+          </a:prstGeom>
+          <a:ln w="38100">
+            <a:gradFill flip="none" rotWithShape="1">
+              <a:gsLst>
+                <a:gs pos="0">
+                  <a:srgbClr val="363D46"/>
+                </a:gs>
+                <a:gs pos="100000">
+                  <a:srgbClr val="363D46">
+                    <a:lumMod val="75000"/>
+                  </a:srgbClr>
+                </a:gs>
+              </a:gsLst>
+              <a:lin ang="5400000" scaled="0"/>
+              <a:tileRect/>
+            </a:gradFill>
+          </a:ln>
+          <a:effectLst>
+            <a:innerShdw blurRad="57150" dist="38100" dir="14460000">
+              <a:srgbClr val="000000">
+                <a:alpha val="70000"/>
+              </a:srgbClr>
+            </a:innerShdw>
+          </a:effectLst>
+        </p:spPr>
+      </p:pic>
+    </p:spTree>
+    <p:extLst>
+      <p:ext uri="{BB962C8B-B14F-4D97-AF65-F5344CB8AC3E}">
+        <p14:creationId xmlns:p14="http://schemas.microsoft.com/office/powerpoint/2010/main" val="225575216"/>
+      </p:ext>
+    </p:extLst>
+  </p:cSld>
+  <p:clrMapOvr>
+    <a:masterClrMapping/>
+  </p:clrMapOvr>
+</p:sld>
+</file>
+
+<file path=ppt/slides/slide8.xml><?xml version="1.0" encoding="utf-8"?>
+<p:sld xmlns:a="http://schemas.openxmlformats.org/drawingml/2006/main" xmlns:r="http://schemas.openxmlformats.org/officeDocument/2006/relationships" xmlns:p="http://schemas.openxmlformats.org/presentationml/2006/main">
+  <p:cSld>
+    <p:spTree>
+      <p:nvGrpSpPr>
+        <p:cNvPr id="1" name=""/>
+        <p:cNvGrpSpPr/>
+        <p:nvPr/>
+      </p:nvGrpSpPr>
+      <p:grpSpPr>
+        <a:xfrm>
+          <a:off x="0" y="0"/>
+          <a:ext cx="0" cy="0"/>
+          <a:chOff x="0" y="0"/>
+          <a:chExt cx="0" cy="0"/>
+        </a:xfrm>
+      </p:grpSpPr>
+      <p:sp>
+        <p:nvSpPr>
+          <p:cNvPr id="2" name="Title 1">
+            <a:extLst>
+              <a:ext uri="{FF2B5EF4-FFF2-40B4-BE49-F238E27FC236}">
+                <a16:creationId xmlns:a16="http://schemas.microsoft.com/office/drawing/2014/main" id="{DAB9D068-3AE1-0A3E-ABC9-22CD7E8368C9}"/>
+              </a:ext>
+            </a:extLst>
+          </p:cNvPr>
+          <p:cNvSpPr>
+            <a:spLocks noGrp="1"/>
+          </p:cNvSpPr>
+          <p:nvPr>
+            <p:ph type="title"/>
+          </p:nvPr>
+        </p:nvSpPr>
+        <p:spPr>
+          <a:xfrm>
+            <a:off x="1001370" y="881448"/>
+            <a:ext cx="9905998" cy="733168"/>
+          </a:xfrm>
+        </p:spPr>
+        <p:txBody>
+          <a:bodyPr/>
+          <a:lstStyle/>
+          <a:p>
+            <a:pPr algn="ctr"/>
+            <a:r>
+              <a:rPr lang="en-US" dirty="0">
+                <a:latin typeface="Arial" panose="020B0604020202020204" pitchFamily="34" charset="0"/>
+                <a:cs typeface="Arial" panose="020B0604020202020204" pitchFamily="34" charset="0"/>
+              </a:rPr>
+              <a:t>List (static) - </a:t>
+            </a:r>
+            <a:r>
+              <a:rPr lang="bg-BG" dirty="0">
+                <a:latin typeface="Arial" panose="020B0604020202020204" pitchFamily="34" charset="0"/>
+                <a:cs typeface="Arial" panose="020B0604020202020204" pitchFamily="34" charset="0"/>
+              </a:rPr>
+              <a:t>ограничения</a:t>
+            </a:r>
+          </a:p>
+        </p:txBody>
+      </p:sp>
+      <p:sp>
+        <p:nvSpPr>
+          <p:cNvPr id="3" name="Content Placeholder 2">
+            <a:extLst>
+              <a:ext uri="{FF2B5EF4-FFF2-40B4-BE49-F238E27FC236}">
+                <a16:creationId xmlns:a16="http://schemas.microsoft.com/office/drawing/2014/main" id="{BB66604F-467A-72C7-63F5-DEF559347997}"/>
+              </a:ext>
+            </a:extLst>
+          </p:cNvPr>
+          <p:cNvSpPr>
+            <a:spLocks noGrp="1"/>
+          </p:cNvSpPr>
+          <p:nvPr>
+            <p:ph idx="1"/>
+          </p:nvPr>
+        </p:nvSpPr>
+        <p:spPr>
+          <a:xfrm>
+            <a:off x="1141413" y="2397212"/>
+            <a:ext cx="9905998" cy="2215978"/>
+          </a:xfrm>
+        </p:spPr>
+        <p:txBody>
+          <a:bodyPr/>
+          <a:lstStyle/>
+          <a:p>
+            <a:r>
+              <a:rPr lang="bg-BG" dirty="0">
+                <a:latin typeface="Arial" panose="020B0604020202020204" pitchFamily="34" charset="0"/>
+                <a:cs typeface="Arial" panose="020B0604020202020204" pitchFamily="34" charset="0"/>
+              </a:rPr>
+              <a:t>Както беше подчертано, абстрактният лист имплементиран чрез </a:t>
+            </a:r>
+            <a:r>
+              <a:rPr lang="bg-BG" dirty="0">
+                <a:solidFill>
+                  <a:srgbClr val="92D050"/>
+                </a:solidFill>
+                <a:latin typeface="Arial" panose="020B0604020202020204" pitchFamily="34" charset="0"/>
+                <a:cs typeface="Arial" panose="020B0604020202020204" pitchFamily="34" charset="0"/>
+              </a:rPr>
+              <a:t>статичен масив </a:t>
+            </a:r>
+            <a:r>
+              <a:rPr lang="bg-BG" dirty="0">
+                <a:latin typeface="Arial" panose="020B0604020202020204" pitchFamily="34" charset="0"/>
+                <a:cs typeface="Arial" panose="020B0604020202020204" pitchFamily="34" charset="0"/>
+              </a:rPr>
+              <a:t>има </a:t>
+            </a:r>
+            <a:r>
+              <a:rPr lang="bg-BG" dirty="0">
+                <a:solidFill>
+                  <a:srgbClr val="92D050"/>
+                </a:solidFill>
+                <a:latin typeface="Arial" panose="020B0604020202020204" pitchFamily="34" charset="0"/>
+                <a:cs typeface="Arial" panose="020B0604020202020204" pitchFamily="34" charset="0"/>
+              </a:rPr>
+              <a:t>фиксиран размер</a:t>
+            </a:r>
+            <a:r>
+              <a:rPr lang="bg-BG" dirty="0">
+                <a:latin typeface="Arial" panose="020B0604020202020204" pitchFamily="34" charset="0"/>
+                <a:cs typeface="Arial" panose="020B0604020202020204" pitchFamily="34" charset="0"/>
+              </a:rPr>
+              <a:t>, който се задава при инициализирането му и след това </a:t>
+            </a:r>
+            <a:r>
+              <a:rPr lang="bg-BG" dirty="0">
+                <a:solidFill>
+                  <a:srgbClr val="92D050"/>
+                </a:solidFill>
+                <a:latin typeface="Arial" panose="020B0604020202020204" pitchFamily="34" charset="0"/>
+                <a:cs typeface="Arial" panose="020B0604020202020204" pitchFamily="34" charset="0"/>
+              </a:rPr>
+              <a:t>не може да се променя</a:t>
+            </a:r>
+            <a:r>
+              <a:rPr lang="bg-BG" dirty="0">
+                <a:latin typeface="Arial" panose="020B0604020202020204" pitchFamily="34" charset="0"/>
+                <a:cs typeface="Arial" panose="020B0604020202020204" pitchFamily="34" charset="0"/>
+              </a:rPr>
+              <a:t>. </a:t>
+            </a:r>
+          </a:p>
+          <a:p>
+            <a:r>
+              <a:rPr lang="bg-BG" dirty="0">
+                <a:latin typeface="Arial" panose="020B0604020202020204" pitchFamily="34" charset="0"/>
+                <a:cs typeface="Arial" panose="020B0604020202020204" pitchFamily="34" charset="0"/>
+              </a:rPr>
+              <a:t>Добавянето на елемент извън рамките на големината на масива реално е </a:t>
+            </a:r>
+            <a:r>
+              <a:rPr lang="bg-BG" dirty="0">
+                <a:solidFill>
+                  <a:srgbClr val="92D050"/>
+                </a:solidFill>
+                <a:latin typeface="Arial" panose="020B0604020202020204" pitchFamily="34" charset="0"/>
+                <a:cs typeface="Arial" panose="020B0604020202020204" pitchFamily="34" charset="0"/>
+              </a:rPr>
+              <a:t>невъзможно</a:t>
+            </a:r>
+            <a:r>
+              <a:rPr lang="bg-BG" dirty="0">
+                <a:latin typeface="Arial" panose="020B0604020202020204" pitchFamily="34" charset="0"/>
+                <a:cs typeface="Arial" panose="020B0604020202020204" pitchFamily="34" charset="0"/>
+              </a:rPr>
+              <a:t>, но все пак може да се направи като се задели </a:t>
+            </a:r>
+            <a:r>
+              <a:rPr lang="bg-BG" dirty="0">
+                <a:solidFill>
+                  <a:srgbClr val="92D050"/>
+                </a:solidFill>
+                <a:latin typeface="Arial" panose="020B0604020202020204" pitchFamily="34" charset="0"/>
+                <a:cs typeface="Arial" panose="020B0604020202020204" pitchFamily="34" charset="0"/>
+              </a:rPr>
+              <a:t>нова памет </a:t>
+            </a:r>
+            <a:r>
+              <a:rPr lang="bg-BG" dirty="0">
+                <a:latin typeface="Arial" panose="020B0604020202020204" pitchFamily="34" charset="0"/>
+                <a:cs typeface="Arial" panose="020B0604020202020204" pitchFamily="34" charset="0"/>
+              </a:rPr>
+              <a:t>за по-голям масив, в който да се преместят елементите.</a:t>
+            </a:r>
+          </a:p>
+        </p:txBody>
+      </p:sp>
+    </p:spTree>
+    <p:extLst>
+      <p:ext uri="{BB962C8B-B14F-4D97-AF65-F5344CB8AC3E}">
+        <p14:creationId xmlns:p14="http://schemas.microsoft.com/office/powerpoint/2010/main" val="2128684182"/>
       </p:ext>
     </p:extLst>
   </p:cSld>

</xml_diff>